<commit_message>
Changing diagram of interventions file name
</commit_message>
<xml_diff>
--- a/manuscripts/diagrams/diagram_interventions_JK_JV.pptx
+++ b/manuscripts/diagrams/diagram_interventions_JK_JV.pptx
@@ -2995,8 +2995,8 @@
         </p:blipFill>
         <p:spPr>
           <a:xfrm>
-            <a:off x="551827" y="891540"/>
-            <a:ext cx="4188558" cy="5074920"/>
+            <a:off x="225462" y="891539"/>
+            <a:ext cx="4514923" cy="5470349"/>
           </a:xfrm>
           <a:prstGeom prst="rect">
             <a:avLst/>
@@ -3018,14 +3018,14 @@
           <p:nvPr>
             <p:extLst>
               <p:ext uri="{D42A27DB-BD31-4B8C-83A1-F6EECF244321}">
-                <p14:modId xmlns:p14="http://schemas.microsoft.com/office/powerpoint/2010/main" val="2359584807"/>
+                <p14:modId xmlns:p14="http://schemas.microsoft.com/office/powerpoint/2010/main" val="93227296"/>
               </p:ext>
             </p:extLst>
           </p:nvPr>
         </p:nvGraphicFramePr>
         <p:xfrm>
-          <a:off x="5313082" y="810153"/>
-          <a:ext cx="6550209" cy="5541645"/>
+          <a:off x="4891278" y="810153"/>
+          <a:ext cx="6972014" cy="5973439"/>
         </p:xfrm>
         <a:graphic>
           <a:graphicData uri="http://schemas.openxmlformats.org/drawingml/2006/table">
@@ -3034,21 +3034,21 @@
                 <a:tableStyleId>{F2DE63D5-997A-4646-A377-4702673A728D}</a:tableStyleId>
               </a:tblPr>
               <a:tblGrid>
-                <a:gridCol w="1894542">
+                <a:gridCol w="2016542">
                   <a:extLst>
                     <a:ext uri="{9D8B030D-6E8A-4147-A177-3AD203B41FA5}">
                       <a16:colId xmlns:a16="http://schemas.microsoft.com/office/drawing/2014/main" val="458690852"/>
                     </a:ext>
                   </a:extLst>
                 </a:gridCol>
-                <a:gridCol w="2472264">
+                <a:gridCol w="2631467">
                   <a:extLst>
                     <a:ext uri="{9D8B030D-6E8A-4147-A177-3AD203B41FA5}">
                       <a16:colId xmlns:a16="http://schemas.microsoft.com/office/drawing/2014/main" val="1329076861"/>
                     </a:ext>
                   </a:extLst>
                 </a:gridCol>
-                <a:gridCol w="2183403">
+                <a:gridCol w="2324005">
                   <a:extLst>
                     <a:ext uri="{9D8B030D-6E8A-4147-A177-3AD203B41FA5}">
                       <a16:colId xmlns:a16="http://schemas.microsoft.com/office/drawing/2014/main" val="1335104796"/>
@@ -3056,7 +3056,7 @@
                   </a:extLst>
                 </a:gridCol>
               </a:tblGrid>
-              <a:tr h="371475">
+              <a:tr h="400420">
                 <a:tc>
                   <a:txBody>
                     <a:bodyPr/>
@@ -3123,7 +3123,7 @@
                   </a:ext>
                 </a:extLst>
               </a:tr>
-              <a:tr h="371475">
+              <a:tr h="420954">
                 <a:tc>
                   <a:txBody>
                     <a:bodyPr/>
@@ -3190,7 +3190,7 @@
                   </a:ext>
                 </a:extLst>
               </a:tr>
-              <a:tr h="371475">
+              <a:tr h="420954">
                 <a:tc>
                   <a:txBody>
                     <a:bodyPr/>
@@ -3257,7 +3257,7 @@
                   </a:ext>
                 </a:extLst>
               </a:tr>
-              <a:tr h="371475">
+              <a:tr h="420954">
                 <a:tc>
                   <a:txBody>
                     <a:bodyPr/>
@@ -3340,7 +3340,7 @@
                   </a:ext>
                 </a:extLst>
               </a:tr>
-              <a:tr h="371475">
+              <a:tr h="420954">
                 <a:tc>
                   <a:txBody>
                     <a:bodyPr/>
@@ -3407,7 +3407,7 @@
                   </a:ext>
                 </a:extLst>
               </a:tr>
-              <a:tr h="962025">
+              <a:tr h="1036984">
                 <a:tc>
                   <a:txBody>
                     <a:bodyPr/>
@@ -3483,7 +3483,7 @@
                   </a:ext>
                 </a:extLst>
               </a:tr>
-              <a:tr h="371475">
+              <a:tr h="782358">
                 <a:tc>
                   <a:txBody>
                     <a:bodyPr/>
@@ -3550,7 +3550,7 @@
                   </a:ext>
                 </a:extLst>
               </a:tr>
-              <a:tr h="371475">
+              <a:tr h="601656">
                 <a:tc>
                   <a:txBody>
                     <a:bodyPr/>
@@ -3611,7 +3611,7 @@
                   </a:ext>
                 </a:extLst>
               </a:tr>
-              <a:tr h="371475">
+              <a:tr h="420954">
                 <a:tc>
                   <a:txBody>
                     <a:bodyPr/>
@@ -3678,7 +3678,7 @@
                   </a:ext>
                 </a:extLst>
               </a:tr>
-              <a:tr h="581025">
+              <a:tr h="626297">
                 <a:tc>
                   <a:txBody>
                     <a:bodyPr/>
@@ -3739,7 +3739,7 @@
                   </a:ext>
                 </a:extLst>
               </a:tr>
-              <a:tr h="371475">
+              <a:tr h="420954">
                 <a:tc>
                   <a:txBody>
                     <a:bodyPr/>
@@ -3838,8 +3838,8 @@
         </p:blipFill>
         <p:spPr>
           <a:xfrm>
-            <a:off x="5010821" y="1204073"/>
-            <a:ext cx="311150" cy="311150"/>
+            <a:off x="4986577" y="1204073"/>
+            <a:ext cx="335394" cy="335394"/>
           </a:xfrm>
           <a:prstGeom prst="rect">
             <a:avLst/>
@@ -3868,8 +3868,8 @@
         </p:blipFill>
         <p:spPr>
           <a:xfrm>
-            <a:off x="5010821" y="1992969"/>
-            <a:ext cx="311150" cy="311150"/>
+            <a:off x="4986577" y="1992969"/>
+            <a:ext cx="335394" cy="335394"/>
           </a:xfrm>
           <a:prstGeom prst="rect">
             <a:avLst/>
@@ -3898,8 +3898,8 @@
         </p:blipFill>
         <p:spPr>
           <a:xfrm>
-            <a:off x="5010821" y="2389406"/>
-            <a:ext cx="311150" cy="311150"/>
+            <a:off x="4986577" y="2389406"/>
+            <a:ext cx="335394" cy="335394"/>
           </a:xfrm>
           <a:prstGeom prst="rect">
             <a:avLst/>
@@ -3928,8 +3928,8 @@
         </p:blipFill>
         <p:spPr>
           <a:xfrm>
-            <a:off x="5010821" y="3063748"/>
-            <a:ext cx="311150" cy="311150"/>
+            <a:off x="4986577" y="3063748"/>
+            <a:ext cx="335394" cy="335394"/>
           </a:xfrm>
           <a:prstGeom prst="rect">
             <a:avLst/>
@@ -3958,8 +3958,8 @@
         </p:blipFill>
         <p:spPr>
           <a:xfrm>
-            <a:off x="5010821" y="3909913"/>
-            <a:ext cx="311150" cy="311150"/>
+            <a:off x="4986577" y="3909913"/>
+            <a:ext cx="335394" cy="335394"/>
           </a:xfrm>
           <a:prstGeom prst="rect">
             <a:avLst/>
@@ -3988,8 +3988,8 @@
         </p:blipFill>
         <p:spPr>
           <a:xfrm>
-            <a:off x="5010821" y="4539926"/>
-            <a:ext cx="311150" cy="311150"/>
+            <a:off x="4986577" y="4539926"/>
+            <a:ext cx="335394" cy="335394"/>
           </a:xfrm>
           <a:prstGeom prst="rect">
             <a:avLst/>
@@ -4018,8 +4018,8 @@
         </p:blipFill>
         <p:spPr>
           <a:xfrm>
-            <a:off x="5010821" y="5039463"/>
-            <a:ext cx="311150" cy="311150"/>
+            <a:off x="4986577" y="5039463"/>
+            <a:ext cx="335394" cy="335394"/>
           </a:xfrm>
           <a:prstGeom prst="rect">
             <a:avLst/>
@@ -4054,8 +4054,8 @@
         </p:blipFill>
         <p:spPr>
           <a:xfrm>
-            <a:off x="8908778" y="2166472"/>
-            <a:ext cx="100895" cy="137584"/>
+            <a:off x="8900918" y="2166472"/>
+            <a:ext cx="108756" cy="148304"/>
           </a:xfrm>
           <a:prstGeom prst="rect">
             <a:avLst/>
@@ -4084,8 +4084,8 @@
         </p:blipFill>
         <p:spPr>
           <a:xfrm>
-            <a:off x="5010821" y="5525554"/>
-            <a:ext cx="311150" cy="311150"/>
+            <a:off x="4986577" y="5525554"/>
+            <a:ext cx="335394" cy="335394"/>
           </a:xfrm>
           <a:prstGeom prst="rect">
             <a:avLst/>
@@ -4120,8 +4120,8 @@
         </p:blipFill>
         <p:spPr>
           <a:xfrm>
-            <a:off x="5011075" y="1596735"/>
-            <a:ext cx="310896" cy="310896"/>
+            <a:off x="4991055" y="1596735"/>
+            <a:ext cx="330916" cy="335120"/>
           </a:xfrm>
           <a:prstGeom prst="rect">
             <a:avLst/>

</xml_diff>